<commit_message>
Adicionei a apresentação desta semana.
</commit_message>
<xml_diff>
--- a/Apresentações/Apresentação0104.pptx
+++ b/Apresentações/Apresentação0104.pptx
@@ -304,7 +304,7 @@
           <a:p>
             <a:fld id="{CD4A1DA0-ED1F-AE48-8F8E-5D400FB10391}" type="datetimeFigureOut">
               <a:rPr lang="en-GB" smtClean="0"/>
-              <a:t>01/04/2020</a:t>
+              <a:t>21/04/2020</a:t>
             </a:fld>
             <a:endParaRPr lang="en-GB"/>
           </a:p>
@@ -642,7 +642,7 @@
           <a:p>
             <a:fld id="{CD4A1DA0-ED1F-AE48-8F8E-5D400FB10391}" type="datetimeFigureOut">
               <a:rPr lang="en-GB" smtClean="0"/>
-              <a:t>01/04/2020</a:t>
+              <a:t>21/04/2020</a:t>
             </a:fld>
             <a:endParaRPr lang="en-GB"/>
           </a:p>
@@ -1043,7 +1043,7 @@
           <a:p>
             <a:fld id="{CD4A1DA0-ED1F-AE48-8F8E-5D400FB10391}" type="datetimeFigureOut">
               <a:rPr lang="en-GB" smtClean="0"/>
-              <a:t>01/04/2020</a:t>
+              <a:t>21/04/2020</a:t>
             </a:fld>
             <a:endParaRPr lang="en-GB"/>
           </a:p>
@@ -1379,7 +1379,7 @@
           <a:p>
             <a:fld id="{CD4A1DA0-ED1F-AE48-8F8E-5D400FB10391}" type="datetimeFigureOut">
               <a:rPr lang="en-GB" smtClean="0"/>
-              <a:t>01/04/2020</a:t>
+              <a:t>21/04/2020</a:t>
             </a:fld>
             <a:endParaRPr lang="en-GB"/>
           </a:p>
@@ -1699,7 +1699,7 @@
           <a:p>
             <a:fld id="{CD4A1DA0-ED1F-AE48-8F8E-5D400FB10391}" type="datetimeFigureOut">
               <a:rPr lang="en-GB" smtClean="0"/>
-              <a:t>01/04/2020</a:t>
+              <a:t>21/04/2020</a:t>
             </a:fld>
             <a:endParaRPr lang="en-GB"/>
           </a:p>
@@ -2095,7 +2095,7 @@
           <a:p>
             <a:fld id="{CD4A1DA0-ED1F-AE48-8F8E-5D400FB10391}" type="datetimeFigureOut">
               <a:rPr lang="en-GB" smtClean="0"/>
-              <a:t>01/04/2020</a:t>
+              <a:t>21/04/2020</a:t>
             </a:fld>
             <a:endParaRPr lang="en-GB"/>
           </a:p>
@@ -2352,7 +2352,7 @@
           <a:p>
             <a:fld id="{CD4A1DA0-ED1F-AE48-8F8E-5D400FB10391}" type="datetimeFigureOut">
               <a:rPr lang="en-GB" smtClean="0"/>
-              <a:t>01/04/2020</a:t>
+              <a:t>21/04/2020</a:t>
             </a:fld>
             <a:endParaRPr lang="en-GB"/>
           </a:p>
@@ -2614,7 +2614,7 @@
           <a:p>
             <a:fld id="{CD4A1DA0-ED1F-AE48-8F8E-5D400FB10391}" type="datetimeFigureOut">
               <a:rPr lang="en-GB" smtClean="0"/>
-              <a:t>01/04/2020</a:t>
+              <a:t>21/04/2020</a:t>
             </a:fld>
             <a:endParaRPr lang="en-GB"/>
           </a:p>
@@ -2876,7 +2876,7 @@
           <a:p>
             <a:fld id="{CD4A1DA0-ED1F-AE48-8F8E-5D400FB10391}" type="datetimeFigureOut">
               <a:rPr lang="en-GB" smtClean="0"/>
-              <a:t>01/04/2020</a:t>
+              <a:t>21/04/2020</a:t>
             </a:fld>
             <a:endParaRPr lang="en-GB"/>
           </a:p>
@@ -3205,7 +3205,7 @@
           <a:p>
             <a:fld id="{CD4A1DA0-ED1F-AE48-8F8E-5D400FB10391}" type="datetimeFigureOut">
               <a:rPr lang="en-GB" smtClean="0"/>
-              <a:t>01/04/2020</a:t>
+              <a:t>21/04/2020</a:t>
             </a:fld>
             <a:endParaRPr lang="en-GB"/>
           </a:p>
@@ -3528,7 +3528,7 @@
           <a:p>
             <a:fld id="{CD4A1DA0-ED1F-AE48-8F8E-5D400FB10391}" type="datetimeFigureOut">
               <a:rPr lang="en-GB" smtClean="0"/>
-              <a:t>01/04/2020</a:t>
+              <a:t>21/04/2020</a:t>
             </a:fld>
             <a:endParaRPr lang="en-GB"/>
           </a:p>
@@ -3985,7 +3985,7 @@
           <a:p>
             <a:fld id="{CD4A1DA0-ED1F-AE48-8F8E-5D400FB10391}" type="datetimeFigureOut">
               <a:rPr lang="en-GB" smtClean="0"/>
-              <a:t>01/04/2020</a:t>
+              <a:t>21/04/2020</a:t>
             </a:fld>
             <a:endParaRPr lang="en-GB"/>
           </a:p>
@@ -4190,7 +4190,7 @@
           <a:p>
             <a:fld id="{CD4A1DA0-ED1F-AE48-8F8E-5D400FB10391}" type="datetimeFigureOut">
               <a:rPr lang="en-GB" smtClean="0"/>
-              <a:t>01/04/2020</a:t>
+              <a:t>21/04/2020</a:t>
             </a:fld>
             <a:endParaRPr lang="en-GB"/>
           </a:p>
@@ -4367,7 +4367,7 @@
           <a:p>
             <a:fld id="{CD4A1DA0-ED1F-AE48-8F8E-5D400FB10391}" type="datetimeFigureOut">
               <a:rPr lang="en-GB" smtClean="0"/>
-              <a:t>01/04/2020</a:t>
+              <a:t>21/04/2020</a:t>
             </a:fld>
             <a:endParaRPr lang="en-GB"/>
           </a:p>
@@ -4700,7 +4700,7 @@
           <a:p>
             <a:fld id="{CD4A1DA0-ED1F-AE48-8F8E-5D400FB10391}" type="datetimeFigureOut">
               <a:rPr lang="en-GB" smtClean="0"/>
-              <a:t>01/04/2020</a:t>
+              <a:t>21/04/2020</a:t>
             </a:fld>
             <a:endParaRPr lang="en-GB"/>
           </a:p>
@@ -5045,7 +5045,7 @@
           <a:p>
             <a:fld id="{CD4A1DA0-ED1F-AE48-8F8E-5D400FB10391}" type="datetimeFigureOut">
               <a:rPr lang="en-GB" smtClean="0"/>
-              <a:t>01/04/2020</a:t>
+              <a:t>21/04/2020</a:t>
             </a:fld>
             <a:endParaRPr lang="en-GB"/>
           </a:p>
@@ -7162,7 +7162,7 @@
           <a:p>
             <a:fld id="{CD4A1DA0-ED1F-AE48-8F8E-5D400FB10391}" type="datetimeFigureOut">
               <a:rPr lang="en-GB" smtClean="0"/>
-              <a:t>01/04/2020</a:t>
+              <a:t>21/04/2020</a:t>
             </a:fld>
             <a:endParaRPr lang="en-GB"/>
           </a:p>
@@ -8435,7 +8435,15 @@
           <a:p>
             <a:r>
               <a:rPr lang="pt-PT" dirty="0"/>
-              <a:t>Para o dia 22 de março fica estabelecido que o registo de utilizador (visitante, colaborador e administrador), marcação de visita e historial de visitas, sendo que o Pedro e o Eduardo trabalharão no </a:t>
+              <a:t>Para o dia 22 </a:t>
+            </a:r>
+            <a:r>
+              <a:rPr lang="pt-PT"/>
+              <a:t>de abril </a:t>
+            </a:r>
+            <a:r>
+              <a:rPr lang="pt-PT" dirty="0"/>
+              <a:t>fica estabelecido que o registo de utilizador (visitante, colaborador e administrador), marcação de visita e historial de visitas, sendo que o Pedro e o Eduardo trabalharão no </a:t>
             </a:r>
             <a:r>
               <a:rPr lang="pt-PT" i="1" dirty="0" err="1"/>

</xml_diff>